<commit_message>
Verwijderen van onnodige import statements
</commit_message>
<xml_diff>
--- a/Paper_werking_draft.pptx
+++ b/Paper_werking_draft.pptx
@@ -7,6 +7,7 @@
   <p:sldIdLst>
     <p:sldId id="256" r:id="rId2"/>
     <p:sldId id="258" r:id="rId3"/>
+    <p:sldId id="259" r:id="rId4"/>
   </p:sldIdLst>
   <p:sldSz cx="9144000" cy="6858000" type="screen4x3"/>
   <p:notesSz cx="6858000" cy="9144000"/>
@@ -105,6 +106,22 @@
       </a:defRPr>
     </a:lvl9pPr>
   </p:defaultTextStyle>
+  <p:extLst>
+    <p:ext uri="{EFAFB233-063F-42B5-8137-9DF3F51BA10A}">
+      <p15:sldGuideLst xmlns:p15="http://schemas.microsoft.com/office/powerpoint/2012/main">
+        <p15:guide id="1" orient="horz" pos="2160">
+          <p15:clr>
+            <a:srgbClr val="A4A3A4"/>
+          </p15:clr>
+        </p15:guide>
+        <p15:guide id="2" pos="2880">
+          <p15:clr>
+            <a:srgbClr val="A4A3A4"/>
+          </p15:clr>
+        </p15:guide>
+      </p15:sldGuideLst>
+    </p:ext>
+  </p:extLst>
 </p:presentation>
 </file>
 
@@ -289,7 +306,7 @@
           <a:p>
             <a:fld id="{9CA7CC6B-6267-4849-ABE7-7E864026F70D}" type="datetimeFigureOut">
               <a:rPr lang="nl-BE" smtClean="0"/>
-              <a:t>15/11/2015</a:t>
+              <a:t>16/11/15</a:t>
             </a:fld>
             <a:endParaRPr lang="nl-BE"/>
           </a:p>
@@ -331,7 +348,7 @@
           <a:p>
             <a:fld id="{570EFB6A-567D-46A7-ABD3-38777F6CAD7D}" type="slidenum">
               <a:rPr lang="nl-BE" smtClean="0"/>
-              <a:t>‹#›</a:t>
+              <a:t>‹nr.›</a:t>
             </a:fld>
             <a:endParaRPr lang="nl-BE"/>
           </a:p>
@@ -459,7 +476,7 @@
           <a:p>
             <a:fld id="{9CA7CC6B-6267-4849-ABE7-7E864026F70D}" type="datetimeFigureOut">
               <a:rPr lang="nl-BE" smtClean="0"/>
-              <a:t>15/11/2015</a:t>
+              <a:t>16/11/15</a:t>
             </a:fld>
             <a:endParaRPr lang="nl-BE"/>
           </a:p>
@@ -501,7 +518,7 @@
           <a:p>
             <a:fld id="{570EFB6A-567D-46A7-ABD3-38777F6CAD7D}" type="slidenum">
               <a:rPr lang="nl-BE" smtClean="0"/>
-              <a:t>‹#›</a:t>
+              <a:t>‹nr.›</a:t>
             </a:fld>
             <a:endParaRPr lang="nl-BE"/>
           </a:p>
@@ -639,7 +656,7 @@
           <a:p>
             <a:fld id="{9CA7CC6B-6267-4849-ABE7-7E864026F70D}" type="datetimeFigureOut">
               <a:rPr lang="nl-BE" smtClean="0"/>
-              <a:t>15/11/2015</a:t>
+              <a:t>16/11/15</a:t>
             </a:fld>
             <a:endParaRPr lang="nl-BE"/>
           </a:p>
@@ -681,7 +698,7 @@
           <a:p>
             <a:fld id="{570EFB6A-567D-46A7-ABD3-38777F6CAD7D}" type="slidenum">
               <a:rPr lang="nl-BE" smtClean="0"/>
-              <a:t>‹#›</a:t>
+              <a:t>‹nr.›</a:t>
             </a:fld>
             <a:endParaRPr lang="nl-BE"/>
           </a:p>
@@ -809,7 +826,7 @@
           <a:p>
             <a:fld id="{9CA7CC6B-6267-4849-ABE7-7E864026F70D}" type="datetimeFigureOut">
               <a:rPr lang="nl-BE" smtClean="0"/>
-              <a:t>15/11/2015</a:t>
+              <a:t>16/11/15</a:t>
             </a:fld>
             <a:endParaRPr lang="nl-BE"/>
           </a:p>
@@ -851,7 +868,7 @@
           <a:p>
             <a:fld id="{570EFB6A-567D-46A7-ABD3-38777F6CAD7D}" type="slidenum">
               <a:rPr lang="nl-BE" smtClean="0"/>
-              <a:t>‹#›</a:t>
+              <a:t>‹nr.›</a:t>
             </a:fld>
             <a:endParaRPr lang="nl-BE"/>
           </a:p>
@@ -1055,7 +1072,7 @@
           <a:p>
             <a:fld id="{9CA7CC6B-6267-4849-ABE7-7E864026F70D}" type="datetimeFigureOut">
               <a:rPr lang="nl-BE" smtClean="0"/>
-              <a:t>15/11/2015</a:t>
+              <a:t>16/11/15</a:t>
             </a:fld>
             <a:endParaRPr lang="nl-BE"/>
           </a:p>
@@ -1097,7 +1114,7 @@
           <a:p>
             <a:fld id="{570EFB6A-567D-46A7-ABD3-38777F6CAD7D}" type="slidenum">
               <a:rPr lang="nl-BE" smtClean="0"/>
-              <a:t>‹#›</a:t>
+              <a:t>‹nr.›</a:t>
             </a:fld>
             <a:endParaRPr lang="nl-BE"/>
           </a:p>
@@ -1343,7 +1360,7 @@
           <a:p>
             <a:fld id="{9CA7CC6B-6267-4849-ABE7-7E864026F70D}" type="datetimeFigureOut">
               <a:rPr lang="nl-BE" smtClean="0"/>
-              <a:t>15/11/2015</a:t>
+              <a:t>16/11/15</a:t>
             </a:fld>
             <a:endParaRPr lang="nl-BE"/>
           </a:p>
@@ -1385,7 +1402,7 @@
           <a:p>
             <a:fld id="{570EFB6A-567D-46A7-ABD3-38777F6CAD7D}" type="slidenum">
               <a:rPr lang="nl-BE" smtClean="0"/>
-              <a:t>‹#›</a:t>
+              <a:t>‹nr.›</a:t>
             </a:fld>
             <a:endParaRPr lang="nl-BE"/>
           </a:p>
@@ -1765,7 +1782,7 @@
           <a:p>
             <a:fld id="{9CA7CC6B-6267-4849-ABE7-7E864026F70D}" type="datetimeFigureOut">
               <a:rPr lang="nl-BE" smtClean="0"/>
-              <a:t>15/11/2015</a:t>
+              <a:t>16/11/15</a:t>
             </a:fld>
             <a:endParaRPr lang="nl-BE"/>
           </a:p>
@@ -1807,7 +1824,7 @@
           <a:p>
             <a:fld id="{570EFB6A-567D-46A7-ABD3-38777F6CAD7D}" type="slidenum">
               <a:rPr lang="nl-BE" smtClean="0"/>
-              <a:t>‹#›</a:t>
+              <a:t>‹nr.›</a:t>
             </a:fld>
             <a:endParaRPr lang="nl-BE"/>
           </a:p>
@@ -1883,7 +1900,7 @@
           <a:p>
             <a:fld id="{9CA7CC6B-6267-4849-ABE7-7E864026F70D}" type="datetimeFigureOut">
               <a:rPr lang="nl-BE" smtClean="0"/>
-              <a:t>15/11/2015</a:t>
+              <a:t>16/11/15</a:t>
             </a:fld>
             <a:endParaRPr lang="nl-BE"/>
           </a:p>
@@ -1925,7 +1942,7 @@
           <a:p>
             <a:fld id="{570EFB6A-567D-46A7-ABD3-38777F6CAD7D}" type="slidenum">
               <a:rPr lang="nl-BE" smtClean="0"/>
-              <a:t>‹#›</a:t>
+              <a:t>‹nr.›</a:t>
             </a:fld>
             <a:endParaRPr lang="nl-BE"/>
           </a:p>
@@ -1978,7 +1995,7 @@
           <a:p>
             <a:fld id="{9CA7CC6B-6267-4849-ABE7-7E864026F70D}" type="datetimeFigureOut">
               <a:rPr lang="nl-BE" smtClean="0"/>
-              <a:t>15/11/2015</a:t>
+              <a:t>16/11/15</a:t>
             </a:fld>
             <a:endParaRPr lang="nl-BE"/>
           </a:p>
@@ -2020,7 +2037,7 @@
           <a:p>
             <a:fld id="{570EFB6A-567D-46A7-ABD3-38777F6CAD7D}" type="slidenum">
               <a:rPr lang="nl-BE" smtClean="0"/>
-              <a:t>‹#›</a:t>
+              <a:t>‹nr.›</a:t>
             </a:fld>
             <a:endParaRPr lang="nl-BE"/>
           </a:p>
@@ -2255,7 +2272,7 @@
           <a:p>
             <a:fld id="{9CA7CC6B-6267-4849-ABE7-7E864026F70D}" type="datetimeFigureOut">
               <a:rPr lang="nl-BE" smtClean="0"/>
-              <a:t>15/11/2015</a:t>
+              <a:t>16/11/15</a:t>
             </a:fld>
             <a:endParaRPr lang="nl-BE"/>
           </a:p>
@@ -2297,7 +2314,7 @@
           <a:p>
             <a:fld id="{570EFB6A-567D-46A7-ABD3-38777F6CAD7D}" type="slidenum">
               <a:rPr lang="nl-BE" smtClean="0"/>
-              <a:t>‹#›</a:t>
+              <a:t>‹nr.›</a:t>
             </a:fld>
             <a:endParaRPr lang="nl-BE"/>
           </a:p>
@@ -2508,7 +2525,7 @@
           <a:p>
             <a:fld id="{9CA7CC6B-6267-4849-ABE7-7E864026F70D}" type="datetimeFigureOut">
               <a:rPr lang="nl-BE" smtClean="0"/>
-              <a:t>15/11/2015</a:t>
+              <a:t>16/11/15</a:t>
             </a:fld>
             <a:endParaRPr lang="nl-BE"/>
           </a:p>
@@ -2550,7 +2567,7 @@
           <a:p>
             <a:fld id="{570EFB6A-567D-46A7-ABD3-38777F6CAD7D}" type="slidenum">
               <a:rPr lang="nl-BE" smtClean="0"/>
-              <a:t>‹#›</a:t>
+              <a:t>‹nr.›</a:t>
             </a:fld>
             <a:endParaRPr lang="nl-BE"/>
           </a:p>
@@ -2721,7 +2738,7 @@
           <a:p>
             <a:fld id="{9CA7CC6B-6267-4849-ABE7-7E864026F70D}" type="datetimeFigureOut">
               <a:rPr lang="nl-BE" smtClean="0"/>
-              <a:t>15/11/2015</a:t>
+              <a:t>16/11/15</a:t>
             </a:fld>
             <a:endParaRPr lang="nl-BE"/>
           </a:p>
@@ -2799,7 +2816,7 @@
           <a:p>
             <a:fld id="{570EFB6A-567D-46A7-ABD3-38777F6CAD7D}" type="slidenum">
               <a:rPr lang="nl-BE" smtClean="0"/>
-              <a:t>‹#›</a:t>
+              <a:t>‹nr.›</a:t>
             </a:fld>
             <a:endParaRPr lang="nl-BE"/>
           </a:p>
@@ -5479,6 +5496,640 @@
 </p:sld>
 </file>
 
+<file path=ppt/slides/slide3.xml><?xml version="1.0" encoding="utf-8"?>
+<p:sld xmlns:a="http://schemas.openxmlformats.org/drawingml/2006/main" xmlns:r="http://schemas.openxmlformats.org/officeDocument/2006/relationships" xmlns:p="http://schemas.openxmlformats.org/presentationml/2006/main">
+  <p:cSld>
+    <p:spTree>
+      <p:nvGrpSpPr>
+        <p:cNvPr id="1" name=""/>
+        <p:cNvGrpSpPr/>
+        <p:nvPr/>
+      </p:nvGrpSpPr>
+      <p:grpSpPr>
+        <a:xfrm>
+          <a:off x="0" y="0"/>
+          <a:ext cx="0" cy="0"/>
+          <a:chOff x="0" y="0"/>
+          <a:chExt cx="0" cy="0"/>
+        </a:xfrm>
+      </p:grpSpPr>
+      <p:sp>
+        <p:nvSpPr>
+          <p:cNvPr id="2" name="Titel 1"/>
+          <p:cNvSpPr>
+            <a:spLocks noGrp="1"/>
+          </p:cNvSpPr>
+          <p:nvPr>
+            <p:ph type="title"/>
+          </p:nvPr>
+        </p:nvSpPr>
+        <p:spPr/>
+        <p:txBody>
+          <a:bodyPr/>
+          <a:lstStyle/>
+          <a:p>
+            <a:r>
+              <a:rPr lang="nl-NL" dirty="0" err="1" smtClean="0"/>
+              <a:t>Generate</a:t>
+            </a:r>
+            <a:endParaRPr lang="nl-NL" dirty="0"/>
+          </a:p>
+        </p:txBody>
+      </p:sp>
+      <p:sp>
+        <p:nvSpPr>
+          <p:cNvPr id="4" name="Rechthoek 3"/>
+          <p:cNvSpPr/>
+          <p:nvPr/>
+        </p:nvSpPr>
+        <p:spPr>
+          <a:xfrm>
+            <a:off x="457200" y="1417638"/>
+            <a:ext cx="7931224" cy="643210"/>
+          </a:xfrm>
+          <a:prstGeom prst="rect">
+            <a:avLst/>
+          </a:prstGeom>
+        </p:spPr>
+        <p:style>
+          <a:lnRef idx="2">
+            <a:schemeClr val="accent1">
+              <a:shade val="50000"/>
+            </a:schemeClr>
+          </a:lnRef>
+          <a:fillRef idx="1">
+            <a:schemeClr val="accent1"/>
+          </a:fillRef>
+          <a:effectRef idx="0">
+            <a:schemeClr val="accent1"/>
+          </a:effectRef>
+          <a:fontRef idx="minor">
+            <a:schemeClr val="lt1"/>
+          </a:fontRef>
+        </p:style>
+        <p:txBody>
+          <a:bodyPr rtlCol="0" anchor="ctr"/>
+          <a:lstStyle/>
+          <a:p>
+            <a:pPr algn="ctr"/>
+            <a:r>
+              <a:rPr lang="nl-NL"/>
+              <a:t>N</a:t>
+            </a:r>
+          </a:p>
+        </p:txBody>
+      </p:sp>
+      <p:sp>
+        <p:nvSpPr>
+          <p:cNvPr id="5" name="Rechthoek 4"/>
+          <p:cNvSpPr/>
+          <p:nvPr/>
+        </p:nvSpPr>
+        <p:spPr>
+          <a:xfrm>
+            <a:off x="444338" y="4005064"/>
+            <a:ext cx="3956350" cy="720080"/>
+          </a:xfrm>
+          <a:prstGeom prst="rect">
+            <a:avLst/>
+          </a:prstGeom>
+        </p:spPr>
+        <p:style>
+          <a:lnRef idx="2">
+            <a:schemeClr val="accent1">
+              <a:shade val="50000"/>
+            </a:schemeClr>
+          </a:lnRef>
+          <a:fillRef idx="1">
+            <a:schemeClr val="accent1"/>
+          </a:fillRef>
+          <a:effectRef idx="0">
+            <a:schemeClr val="accent1"/>
+          </a:effectRef>
+          <a:fontRef idx="minor">
+            <a:schemeClr val="lt1"/>
+          </a:fontRef>
+        </p:style>
+        <p:txBody>
+          <a:bodyPr rtlCol="0" anchor="ctr"/>
+          <a:lstStyle/>
+          <a:p>
+            <a:pPr algn="ctr"/>
+            <a:r>
+              <a:rPr lang="nl-NL" dirty="0" smtClean="0"/>
+              <a:t>Thread1(N)</a:t>
+            </a:r>
+          </a:p>
+        </p:txBody>
+      </p:sp>
+      <p:sp>
+        <p:nvSpPr>
+          <p:cNvPr id="6" name="Rechthoek 5"/>
+          <p:cNvSpPr/>
+          <p:nvPr/>
+        </p:nvSpPr>
+        <p:spPr>
+          <a:xfrm>
+            <a:off x="4441632" y="4005064"/>
+            <a:ext cx="3960440" cy="720080"/>
+          </a:xfrm>
+          <a:prstGeom prst="rect">
+            <a:avLst/>
+          </a:prstGeom>
+        </p:spPr>
+        <p:style>
+          <a:lnRef idx="2">
+            <a:schemeClr val="accent1">
+              <a:shade val="50000"/>
+            </a:schemeClr>
+          </a:lnRef>
+          <a:fillRef idx="1">
+            <a:schemeClr val="accent1"/>
+          </a:fillRef>
+          <a:effectRef idx="0">
+            <a:schemeClr val="accent1"/>
+          </a:effectRef>
+          <a:fontRef idx="minor">
+            <a:schemeClr val="lt1"/>
+          </a:fontRef>
+        </p:style>
+        <p:txBody>
+          <a:bodyPr rtlCol="0" anchor="ctr"/>
+          <a:lstStyle/>
+          <a:p>
+            <a:pPr algn="ctr"/>
+            <a:r>
+              <a:rPr lang="nl-NL" dirty="0" smtClean="0"/>
+              <a:t>Thread2(N)</a:t>
+            </a:r>
+          </a:p>
+        </p:txBody>
+      </p:sp>
+      <p:sp>
+        <p:nvSpPr>
+          <p:cNvPr id="7" name="Pijl omlaag 6"/>
+          <p:cNvSpPr/>
+          <p:nvPr/>
+        </p:nvSpPr>
+        <p:spPr>
+          <a:xfrm>
+            <a:off x="1990465" y="2060848"/>
+            <a:ext cx="864096" cy="1944216"/>
+          </a:xfrm>
+          <a:prstGeom prst="downArrow">
+            <a:avLst/>
+          </a:prstGeom>
+        </p:spPr>
+        <p:style>
+          <a:lnRef idx="2">
+            <a:schemeClr val="accent1">
+              <a:shade val="50000"/>
+            </a:schemeClr>
+          </a:lnRef>
+          <a:fillRef idx="1">
+            <a:schemeClr val="accent1"/>
+          </a:fillRef>
+          <a:effectRef idx="0">
+            <a:schemeClr val="accent1"/>
+          </a:effectRef>
+          <a:fontRef idx="minor">
+            <a:schemeClr val="lt1"/>
+          </a:fontRef>
+        </p:style>
+        <p:txBody>
+          <a:bodyPr rtlCol="0" anchor="ctr"/>
+          <a:lstStyle/>
+          <a:p>
+            <a:pPr algn="ctr"/>
+            <a:endParaRPr lang="nl-NL"/>
+          </a:p>
+        </p:txBody>
+      </p:sp>
+      <p:sp>
+        <p:nvSpPr>
+          <p:cNvPr id="8" name="Pijl omlaag 7"/>
+          <p:cNvSpPr/>
+          <p:nvPr/>
+        </p:nvSpPr>
+        <p:spPr>
+          <a:xfrm>
+            <a:off x="5989804" y="2060848"/>
+            <a:ext cx="864096" cy="1944216"/>
+          </a:xfrm>
+          <a:prstGeom prst="downArrow">
+            <a:avLst/>
+          </a:prstGeom>
+        </p:spPr>
+        <p:style>
+          <a:lnRef idx="2">
+            <a:schemeClr val="accent1">
+              <a:shade val="50000"/>
+            </a:schemeClr>
+          </a:lnRef>
+          <a:fillRef idx="1">
+            <a:schemeClr val="accent1"/>
+          </a:fillRef>
+          <a:effectRef idx="0">
+            <a:schemeClr val="accent1"/>
+          </a:effectRef>
+          <a:fontRef idx="minor">
+            <a:schemeClr val="lt1"/>
+          </a:fontRef>
+        </p:style>
+        <p:txBody>
+          <a:bodyPr rtlCol="0" anchor="ctr"/>
+          <a:lstStyle/>
+          <a:p>
+            <a:pPr algn="ctr"/>
+            <a:endParaRPr lang="nl-NL"/>
+          </a:p>
+        </p:txBody>
+      </p:sp>
+      <p:sp>
+        <p:nvSpPr>
+          <p:cNvPr id="9" name="Tekstvak 8"/>
+          <p:cNvSpPr txBox="1"/>
+          <p:nvPr/>
+        </p:nvSpPr>
+        <p:spPr>
+          <a:xfrm>
+            <a:off x="2854561" y="2636912"/>
+            <a:ext cx="1013611" cy="369332"/>
+          </a:xfrm>
+          <a:prstGeom prst="rect">
+            <a:avLst/>
+          </a:prstGeom>
+          <a:noFill/>
+        </p:spPr>
+        <p:txBody>
+          <a:bodyPr wrap="none" rtlCol="0">
+            <a:spAutoFit/>
+          </a:bodyPr>
+          <a:lstStyle/>
+          <a:p>
+            <a:r>
+              <a:rPr lang="nl-NL" dirty="0" smtClean="0"/>
+              <a:t>Thread 1</a:t>
+            </a:r>
+            <a:endParaRPr lang="nl-NL" dirty="0"/>
+          </a:p>
+        </p:txBody>
+      </p:sp>
+      <p:sp>
+        <p:nvSpPr>
+          <p:cNvPr id="10" name="Tekstvak 9"/>
+          <p:cNvSpPr txBox="1"/>
+          <p:nvPr/>
+        </p:nvSpPr>
+        <p:spPr>
+          <a:xfrm>
+            <a:off x="6844991" y="2744576"/>
+            <a:ext cx="1013611" cy="369332"/>
+          </a:xfrm>
+          <a:prstGeom prst="rect">
+            <a:avLst/>
+          </a:prstGeom>
+          <a:noFill/>
+        </p:spPr>
+        <p:txBody>
+          <a:bodyPr wrap="none" rtlCol="0">
+            <a:spAutoFit/>
+          </a:bodyPr>
+          <a:lstStyle/>
+          <a:p>
+            <a:r>
+              <a:rPr lang="nl-NL" dirty="0" smtClean="0"/>
+              <a:t>Thread 2</a:t>
+            </a:r>
+            <a:endParaRPr lang="nl-NL" dirty="0"/>
+          </a:p>
+        </p:txBody>
+      </p:sp>
+      <p:sp>
+        <p:nvSpPr>
+          <p:cNvPr id="11" name="Ingekeepte pijl rechts 10"/>
+          <p:cNvSpPr/>
+          <p:nvPr/>
+        </p:nvSpPr>
+        <p:spPr>
+          <a:xfrm rot="5400000">
+            <a:off x="3810744" y="4881676"/>
+            <a:ext cx="1224136" cy="936104"/>
+          </a:xfrm>
+          <a:prstGeom prst="notchedRightArrow">
+            <a:avLst/>
+          </a:prstGeom>
+        </p:spPr>
+        <p:style>
+          <a:lnRef idx="2">
+            <a:schemeClr val="accent1">
+              <a:shade val="50000"/>
+            </a:schemeClr>
+          </a:lnRef>
+          <a:fillRef idx="1">
+            <a:schemeClr val="accent1"/>
+          </a:fillRef>
+          <a:effectRef idx="0">
+            <a:schemeClr val="accent1"/>
+          </a:effectRef>
+          <a:fontRef idx="minor">
+            <a:schemeClr val="lt1"/>
+          </a:fontRef>
+        </p:style>
+        <p:txBody>
+          <a:bodyPr rtlCol="0" anchor="ctr"/>
+          <a:lstStyle/>
+          <a:p>
+            <a:pPr algn="ctr"/>
+            <a:endParaRPr lang="nl-NL"/>
+          </a:p>
+        </p:txBody>
+      </p:sp>
+      <p:sp>
+        <p:nvSpPr>
+          <p:cNvPr id="12" name="Rechthoek 11"/>
+          <p:cNvSpPr/>
+          <p:nvPr/>
+        </p:nvSpPr>
+        <p:spPr>
+          <a:xfrm>
+            <a:off x="435076" y="5974312"/>
+            <a:ext cx="7931224" cy="643210"/>
+          </a:xfrm>
+          <a:prstGeom prst="rect">
+            <a:avLst/>
+          </a:prstGeom>
+        </p:spPr>
+        <p:style>
+          <a:lnRef idx="2">
+            <a:schemeClr val="accent1">
+              <a:shade val="50000"/>
+            </a:schemeClr>
+          </a:lnRef>
+          <a:fillRef idx="1">
+            <a:schemeClr val="accent1"/>
+          </a:fillRef>
+          <a:effectRef idx="0">
+            <a:schemeClr val="accent1"/>
+          </a:effectRef>
+          <a:fontRef idx="minor">
+            <a:schemeClr val="lt1"/>
+          </a:fontRef>
+        </p:style>
+        <p:txBody>
+          <a:bodyPr rtlCol="0" anchor="ctr"/>
+          <a:lstStyle/>
+          <a:p>
+            <a:pPr algn="ctr"/>
+            <a:r>
+              <a:rPr lang="nl-NL" dirty="0" smtClean="0"/>
+              <a:t>N+1</a:t>
+            </a:r>
+            <a:endParaRPr lang="nl-NL" dirty="0"/>
+          </a:p>
+        </p:txBody>
+      </p:sp>
+      <p:sp>
+        <p:nvSpPr>
+          <p:cNvPr id="13" name="Rechthoek 12"/>
+          <p:cNvSpPr/>
+          <p:nvPr/>
+        </p:nvSpPr>
+        <p:spPr>
+          <a:xfrm>
+            <a:off x="435076" y="5974312"/>
+            <a:ext cx="1256604" cy="643210"/>
+          </a:xfrm>
+          <a:prstGeom prst="rect">
+            <a:avLst/>
+          </a:prstGeom>
+        </p:spPr>
+        <p:style>
+          <a:lnRef idx="2">
+            <a:schemeClr val="dk1">
+              <a:shade val="50000"/>
+            </a:schemeClr>
+          </a:lnRef>
+          <a:fillRef idx="1">
+            <a:schemeClr val="dk1"/>
+          </a:fillRef>
+          <a:effectRef idx="0">
+            <a:schemeClr val="dk1"/>
+          </a:effectRef>
+          <a:fontRef idx="minor">
+            <a:schemeClr val="lt1"/>
+          </a:fontRef>
+        </p:style>
+        <p:txBody>
+          <a:bodyPr rtlCol="0" anchor="ctr"/>
+          <a:lstStyle/>
+          <a:p>
+            <a:pPr algn="ctr"/>
+            <a:r>
+              <a:rPr lang="nl-NL" dirty="0" smtClean="0"/>
+              <a:t>Big </a:t>
+            </a:r>
+            <a:r>
+              <a:rPr lang="nl-NL" dirty="0" err="1" smtClean="0"/>
+              <a:t>ArrayList</a:t>
+            </a:r>
+            <a:endParaRPr lang="nl-NL" dirty="0"/>
+          </a:p>
+        </p:txBody>
+      </p:sp>
+      <p:sp>
+        <p:nvSpPr>
+          <p:cNvPr id="14" name="Rechthoek 13"/>
+          <p:cNvSpPr/>
+          <p:nvPr/>
+        </p:nvSpPr>
+        <p:spPr>
+          <a:xfrm>
+            <a:off x="447495" y="4005064"/>
+            <a:ext cx="1256604" cy="732596"/>
+          </a:xfrm>
+          <a:prstGeom prst="rect">
+            <a:avLst/>
+          </a:prstGeom>
+        </p:spPr>
+        <p:style>
+          <a:lnRef idx="2">
+            <a:schemeClr val="dk1">
+              <a:shade val="50000"/>
+            </a:schemeClr>
+          </a:lnRef>
+          <a:fillRef idx="1">
+            <a:schemeClr val="dk1"/>
+          </a:fillRef>
+          <a:effectRef idx="0">
+            <a:schemeClr val="dk1"/>
+          </a:effectRef>
+          <a:fontRef idx="minor">
+            <a:schemeClr val="lt1"/>
+          </a:fontRef>
+        </p:style>
+        <p:txBody>
+          <a:bodyPr rtlCol="0" anchor="ctr"/>
+          <a:lstStyle/>
+          <a:p>
+            <a:pPr algn="ctr"/>
+            <a:r>
+              <a:rPr lang="nl-NL" smtClean="0"/>
+              <a:t>Big List</a:t>
+            </a:r>
+            <a:endParaRPr lang="nl-NL" dirty="0"/>
+          </a:p>
+        </p:txBody>
+      </p:sp>
+      <p:sp>
+        <p:nvSpPr>
+          <p:cNvPr id="15" name="Rechthoek 14"/>
+          <p:cNvSpPr/>
+          <p:nvPr/>
+        </p:nvSpPr>
+        <p:spPr>
+          <a:xfrm>
+            <a:off x="4440341" y="4005064"/>
+            <a:ext cx="1256604" cy="732596"/>
+          </a:xfrm>
+          <a:prstGeom prst="rect">
+            <a:avLst/>
+          </a:prstGeom>
+        </p:spPr>
+        <p:style>
+          <a:lnRef idx="2">
+            <a:schemeClr val="dk1">
+              <a:shade val="50000"/>
+            </a:schemeClr>
+          </a:lnRef>
+          <a:fillRef idx="1">
+            <a:schemeClr val="dk1"/>
+          </a:fillRef>
+          <a:effectRef idx="0">
+            <a:schemeClr val="dk1"/>
+          </a:effectRef>
+          <a:fontRef idx="minor">
+            <a:schemeClr val="lt1"/>
+          </a:fontRef>
+        </p:style>
+        <p:txBody>
+          <a:bodyPr rtlCol="0" anchor="ctr"/>
+          <a:lstStyle/>
+          <a:p>
+            <a:pPr algn="ctr"/>
+            <a:r>
+              <a:rPr lang="nl-NL" smtClean="0"/>
+              <a:t>Big List</a:t>
+            </a:r>
+            <a:endParaRPr lang="nl-NL" dirty="0"/>
+          </a:p>
+        </p:txBody>
+      </p:sp>
+      <p:sp>
+        <p:nvSpPr>
+          <p:cNvPr id="16" name="Rechthoek 15"/>
+          <p:cNvSpPr/>
+          <p:nvPr/>
+        </p:nvSpPr>
+        <p:spPr>
+          <a:xfrm>
+            <a:off x="455941" y="1419511"/>
+            <a:ext cx="1256604" cy="643210"/>
+          </a:xfrm>
+          <a:prstGeom prst="rect">
+            <a:avLst/>
+          </a:prstGeom>
+        </p:spPr>
+        <p:style>
+          <a:lnRef idx="2">
+            <a:schemeClr val="dk1">
+              <a:shade val="50000"/>
+            </a:schemeClr>
+          </a:lnRef>
+          <a:fillRef idx="1">
+            <a:schemeClr val="dk1"/>
+          </a:fillRef>
+          <a:effectRef idx="0">
+            <a:schemeClr val="dk1"/>
+          </a:effectRef>
+          <a:fontRef idx="minor">
+            <a:schemeClr val="lt1"/>
+          </a:fontRef>
+        </p:style>
+        <p:txBody>
+          <a:bodyPr rtlCol="0" anchor="ctr"/>
+          <a:lstStyle/>
+          <a:p>
+            <a:pPr algn="ctr"/>
+            <a:r>
+              <a:rPr lang="nl-NL" dirty="0" smtClean="0"/>
+              <a:t>Big </a:t>
+            </a:r>
+            <a:r>
+              <a:rPr lang="nl-NL" dirty="0" err="1" smtClean="0"/>
+              <a:t>ArrayList</a:t>
+            </a:r>
+            <a:endParaRPr lang="nl-NL" dirty="0"/>
+          </a:p>
+        </p:txBody>
+      </p:sp>
+      <p:sp>
+        <p:nvSpPr>
+          <p:cNvPr id="17" name="Gekromde pijl links 16"/>
+          <p:cNvSpPr/>
+          <p:nvPr/>
+        </p:nvSpPr>
+        <p:spPr>
+          <a:xfrm rot="10800000">
+            <a:off x="-1686556" y="1474699"/>
+            <a:ext cx="2118087" cy="5060730"/>
+          </a:xfrm>
+          <a:prstGeom prst="curvedLeftArrow">
+            <a:avLst/>
+          </a:prstGeom>
+        </p:spPr>
+        <p:style>
+          <a:lnRef idx="2">
+            <a:schemeClr val="accent1">
+              <a:shade val="50000"/>
+            </a:schemeClr>
+          </a:lnRef>
+          <a:fillRef idx="1">
+            <a:schemeClr val="accent1"/>
+          </a:fillRef>
+          <a:effectRef idx="0">
+            <a:schemeClr val="accent1"/>
+          </a:effectRef>
+          <a:fontRef idx="minor">
+            <a:schemeClr val="lt1"/>
+          </a:fontRef>
+        </p:style>
+        <p:txBody>
+          <a:bodyPr rtlCol="0" anchor="ctr"/>
+          <a:lstStyle/>
+          <a:p>
+            <a:pPr algn="ctr"/>
+            <a:endParaRPr lang="nl-NL">
+              <a:solidFill>
+                <a:schemeClr val="tx1"/>
+              </a:solidFill>
+            </a:endParaRPr>
+          </a:p>
+        </p:txBody>
+      </p:sp>
+    </p:spTree>
+    <p:extLst>
+      <p:ext uri="{BB962C8B-B14F-4D97-AF65-F5344CB8AC3E}">
+        <p14:creationId xmlns:p14="http://schemas.microsoft.com/office/powerpoint/2010/main" val="781012639"/>
+      </p:ext>
+    </p:extLst>
+  </p:cSld>
+  <p:clrMapOvr>
+    <a:masterClrMapping/>
+  </p:clrMapOvr>
+</p:sld>
+</file>
+
 <file path=ppt/theme/theme1.xml><?xml version="1.0" encoding="utf-8"?>
 <a:theme xmlns:a="http://schemas.openxmlformats.org/drawingml/2006/main" name="Office Theme">
   <a:themeElements>

</xml_diff>

<commit_message>
Updated some minor details.
</commit_message>
<xml_diff>
--- a/Paper_werking_draft.pptx
+++ b/Paper_werking_draft.pptx
@@ -8,6 +8,7 @@
     <p:sldId id="256" r:id="rId2"/>
     <p:sldId id="258" r:id="rId3"/>
     <p:sldId id="259" r:id="rId4"/>
+    <p:sldId id="260" r:id="rId5"/>
   </p:sldIdLst>
   <p:sldSz cx="9144000" cy="6858000" type="screen4x3"/>
   <p:notesSz cx="6858000" cy="9144000"/>
@@ -108,7 +109,7 @@
   </p:defaultTextStyle>
   <p:extLst>
     <p:ext uri="{EFAFB233-063F-42B5-8137-9DF3F51BA10A}">
-      <p15:sldGuideLst xmlns:p15="http://schemas.microsoft.com/office/powerpoint/2012/main">
+      <p15:sldGuideLst xmlns:p15="http://schemas.microsoft.com/office/powerpoint/2012/main" xmlns="">
         <p15:guide id="1" orient="horz" pos="2160">
           <p15:clr>
             <a:srgbClr val="A4A3A4"/>
@@ -306,7 +307,7 @@
           <a:p>
             <a:fld id="{9CA7CC6B-6267-4849-ABE7-7E864026F70D}" type="datetimeFigureOut">
               <a:rPr lang="nl-BE" smtClean="0"/>
-              <a:t>16/11/15</a:t>
+              <a:t>18/11/2015</a:t>
             </a:fld>
             <a:endParaRPr lang="nl-BE"/>
           </a:p>
@@ -348,7 +349,7 @@
           <a:p>
             <a:fld id="{570EFB6A-567D-46A7-ABD3-38777F6CAD7D}" type="slidenum">
               <a:rPr lang="nl-BE" smtClean="0"/>
-              <a:t>‹nr.›</a:t>
+              <a:t>‹#›</a:t>
             </a:fld>
             <a:endParaRPr lang="nl-BE"/>
           </a:p>
@@ -476,7 +477,7 @@
           <a:p>
             <a:fld id="{9CA7CC6B-6267-4849-ABE7-7E864026F70D}" type="datetimeFigureOut">
               <a:rPr lang="nl-BE" smtClean="0"/>
-              <a:t>16/11/15</a:t>
+              <a:t>18/11/2015</a:t>
             </a:fld>
             <a:endParaRPr lang="nl-BE"/>
           </a:p>
@@ -518,7 +519,7 @@
           <a:p>
             <a:fld id="{570EFB6A-567D-46A7-ABD3-38777F6CAD7D}" type="slidenum">
               <a:rPr lang="nl-BE" smtClean="0"/>
-              <a:t>‹nr.›</a:t>
+              <a:t>‹#›</a:t>
             </a:fld>
             <a:endParaRPr lang="nl-BE"/>
           </a:p>
@@ -656,7 +657,7 @@
           <a:p>
             <a:fld id="{9CA7CC6B-6267-4849-ABE7-7E864026F70D}" type="datetimeFigureOut">
               <a:rPr lang="nl-BE" smtClean="0"/>
-              <a:t>16/11/15</a:t>
+              <a:t>18/11/2015</a:t>
             </a:fld>
             <a:endParaRPr lang="nl-BE"/>
           </a:p>
@@ -698,7 +699,7 @@
           <a:p>
             <a:fld id="{570EFB6A-567D-46A7-ABD3-38777F6CAD7D}" type="slidenum">
               <a:rPr lang="nl-BE" smtClean="0"/>
-              <a:t>‹nr.›</a:t>
+              <a:t>‹#›</a:t>
             </a:fld>
             <a:endParaRPr lang="nl-BE"/>
           </a:p>
@@ -826,7 +827,7 @@
           <a:p>
             <a:fld id="{9CA7CC6B-6267-4849-ABE7-7E864026F70D}" type="datetimeFigureOut">
               <a:rPr lang="nl-BE" smtClean="0"/>
-              <a:t>16/11/15</a:t>
+              <a:t>18/11/2015</a:t>
             </a:fld>
             <a:endParaRPr lang="nl-BE"/>
           </a:p>
@@ -868,7 +869,7 @@
           <a:p>
             <a:fld id="{570EFB6A-567D-46A7-ABD3-38777F6CAD7D}" type="slidenum">
               <a:rPr lang="nl-BE" smtClean="0"/>
-              <a:t>‹nr.›</a:t>
+              <a:t>‹#›</a:t>
             </a:fld>
             <a:endParaRPr lang="nl-BE"/>
           </a:p>
@@ -1072,7 +1073,7 @@
           <a:p>
             <a:fld id="{9CA7CC6B-6267-4849-ABE7-7E864026F70D}" type="datetimeFigureOut">
               <a:rPr lang="nl-BE" smtClean="0"/>
-              <a:t>16/11/15</a:t>
+              <a:t>18/11/2015</a:t>
             </a:fld>
             <a:endParaRPr lang="nl-BE"/>
           </a:p>
@@ -1114,7 +1115,7 @@
           <a:p>
             <a:fld id="{570EFB6A-567D-46A7-ABD3-38777F6CAD7D}" type="slidenum">
               <a:rPr lang="nl-BE" smtClean="0"/>
-              <a:t>‹nr.›</a:t>
+              <a:t>‹#›</a:t>
             </a:fld>
             <a:endParaRPr lang="nl-BE"/>
           </a:p>
@@ -1360,7 +1361,7 @@
           <a:p>
             <a:fld id="{9CA7CC6B-6267-4849-ABE7-7E864026F70D}" type="datetimeFigureOut">
               <a:rPr lang="nl-BE" smtClean="0"/>
-              <a:t>16/11/15</a:t>
+              <a:t>18/11/2015</a:t>
             </a:fld>
             <a:endParaRPr lang="nl-BE"/>
           </a:p>
@@ -1402,7 +1403,7 @@
           <a:p>
             <a:fld id="{570EFB6A-567D-46A7-ABD3-38777F6CAD7D}" type="slidenum">
               <a:rPr lang="nl-BE" smtClean="0"/>
-              <a:t>‹nr.›</a:t>
+              <a:t>‹#›</a:t>
             </a:fld>
             <a:endParaRPr lang="nl-BE"/>
           </a:p>
@@ -1782,7 +1783,7 @@
           <a:p>
             <a:fld id="{9CA7CC6B-6267-4849-ABE7-7E864026F70D}" type="datetimeFigureOut">
               <a:rPr lang="nl-BE" smtClean="0"/>
-              <a:t>16/11/15</a:t>
+              <a:t>18/11/2015</a:t>
             </a:fld>
             <a:endParaRPr lang="nl-BE"/>
           </a:p>
@@ -1824,7 +1825,7 @@
           <a:p>
             <a:fld id="{570EFB6A-567D-46A7-ABD3-38777F6CAD7D}" type="slidenum">
               <a:rPr lang="nl-BE" smtClean="0"/>
-              <a:t>‹nr.›</a:t>
+              <a:t>‹#›</a:t>
             </a:fld>
             <a:endParaRPr lang="nl-BE"/>
           </a:p>
@@ -1900,7 +1901,7 @@
           <a:p>
             <a:fld id="{9CA7CC6B-6267-4849-ABE7-7E864026F70D}" type="datetimeFigureOut">
               <a:rPr lang="nl-BE" smtClean="0"/>
-              <a:t>16/11/15</a:t>
+              <a:t>18/11/2015</a:t>
             </a:fld>
             <a:endParaRPr lang="nl-BE"/>
           </a:p>
@@ -1942,7 +1943,7 @@
           <a:p>
             <a:fld id="{570EFB6A-567D-46A7-ABD3-38777F6CAD7D}" type="slidenum">
               <a:rPr lang="nl-BE" smtClean="0"/>
-              <a:t>‹nr.›</a:t>
+              <a:t>‹#›</a:t>
             </a:fld>
             <a:endParaRPr lang="nl-BE"/>
           </a:p>
@@ -1995,7 +1996,7 @@
           <a:p>
             <a:fld id="{9CA7CC6B-6267-4849-ABE7-7E864026F70D}" type="datetimeFigureOut">
               <a:rPr lang="nl-BE" smtClean="0"/>
-              <a:t>16/11/15</a:t>
+              <a:t>18/11/2015</a:t>
             </a:fld>
             <a:endParaRPr lang="nl-BE"/>
           </a:p>
@@ -2037,7 +2038,7 @@
           <a:p>
             <a:fld id="{570EFB6A-567D-46A7-ABD3-38777F6CAD7D}" type="slidenum">
               <a:rPr lang="nl-BE" smtClean="0"/>
-              <a:t>‹nr.›</a:t>
+              <a:t>‹#›</a:t>
             </a:fld>
             <a:endParaRPr lang="nl-BE"/>
           </a:p>
@@ -2272,7 +2273,7 @@
           <a:p>
             <a:fld id="{9CA7CC6B-6267-4849-ABE7-7E864026F70D}" type="datetimeFigureOut">
               <a:rPr lang="nl-BE" smtClean="0"/>
-              <a:t>16/11/15</a:t>
+              <a:t>18/11/2015</a:t>
             </a:fld>
             <a:endParaRPr lang="nl-BE"/>
           </a:p>
@@ -2314,7 +2315,7 @@
           <a:p>
             <a:fld id="{570EFB6A-567D-46A7-ABD3-38777F6CAD7D}" type="slidenum">
               <a:rPr lang="nl-BE" smtClean="0"/>
-              <a:t>‹nr.›</a:t>
+              <a:t>‹#›</a:t>
             </a:fld>
             <a:endParaRPr lang="nl-BE"/>
           </a:p>
@@ -2525,7 +2526,7 @@
           <a:p>
             <a:fld id="{9CA7CC6B-6267-4849-ABE7-7E864026F70D}" type="datetimeFigureOut">
               <a:rPr lang="nl-BE" smtClean="0"/>
-              <a:t>16/11/15</a:t>
+              <a:t>18/11/2015</a:t>
             </a:fld>
             <a:endParaRPr lang="nl-BE"/>
           </a:p>
@@ -2567,7 +2568,7 @@
           <a:p>
             <a:fld id="{570EFB6A-567D-46A7-ABD3-38777F6CAD7D}" type="slidenum">
               <a:rPr lang="nl-BE" smtClean="0"/>
-              <a:t>‹nr.›</a:t>
+              <a:t>‹#›</a:t>
             </a:fld>
             <a:endParaRPr lang="nl-BE"/>
           </a:p>
@@ -2738,7 +2739,7 @@
           <a:p>
             <a:fld id="{9CA7CC6B-6267-4849-ABE7-7E864026F70D}" type="datetimeFigureOut">
               <a:rPr lang="nl-BE" smtClean="0"/>
-              <a:t>16/11/15</a:t>
+              <a:t>18/11/2015</a:t>
             </a:fld>
             <a:endParaRPr lang="nl-BE"/>
           </a:p>
@@ -2816,7 +2817,7 @@
           <a:p>
             <a:fld id="{570EFB6A-567D-46A7-ABD3-38777F6CAD7D}" type="slidenum">
               <a:rPr lang="nl-BE" smtClean="0"/>
-              <a:t>‹nr.›</a:t>
+              <a:t>‹#›</a:t>
             </a:fld>
             <a:endParaRPr lang="nl-BE"/>
           </a:p>
@@ -3115,18 +3116,28 @@
       </p:grpSpPr>
       <p:sp>
         <p:nvSpPr>
-          <p:cNvPr id="5" name="Rectangle 4"/>
+          <p:cNvPr id="33" name="Rectangle 32"/>
           <p:cNvSpPr/>
           <p:nvPr/>
         </p:nvSpPr>
         <p:spPr>
           <a:xfrm>
-            <a:off x="1589043" y="116632"/>
-            <a:ext cx="1440160" cy="720080"/>
-          </a:xfrm>
-          <a:prstGeom prst="rect">
-            <a:avLst/>
-          </a:prstGeom>
+            <a:off x="1448204" y="0"/>
+            <a:ext cx="7804315" cy="953726"/>
+          </a:xfrm>
+          <a:prstGeom prst="rect">
+            <a:avLst/>
+          </a:prstGeom>
+          <a:solidFill>
+            <a:schemeClr val="bg2">
+              <a:lumMod val="75000"/>
+            </a:schemeClr>
+          </a:solidFill>
+          <a:ln>
+            <a:solidFill>
+              <a:schemeClr val="bg2"/>
+            </a:solidFill>
+          </a:ln>
         </p:spPr>
         <p:style>
           <a:lnRef idx="2">
@@ -3155,18 +3166,26 @@
       </p:sp>
       <p:sp>
         <p:nvSpPr>
-          <p:cNvPr id="6" name="Rectangle 5"/>
+          <p:cNvPr id="5" name="Rectangle 4"/>
           <p:cNvSpPr/>
           <p:nvPr/>
         </p:nvSpPr>
         <p:spPr>
           <a:xfrm>
-            <a:off x="3131840" y="116632"/>
+            <a:off x="1589043" y="116632"/>
             <a:ext cx="1440160" cy="720080"/>
           </a:xfrm>
           <a:prstGeom prst="rect">
             <a:avLst/>
           </a:prstGeom>
+          <a:solidFill>
+            <a:schemeClr val="bg2">
+              <a:lumMod val="75000"/>
+            </a:schemeClr>
+          </a:solidFill>
+          <a:ln>
+            <a:noFill/>
+          </a:ln>
         </p:spPr>
         <p:style>
           <a:lnRef idx="2">
@@ -3189,19 +3208,23 @@
           <a:lstStyle/>
           <a:p>
             <a:pPr algn="ctr"/>
-            <a:endParaRPr lang="nl-BE"/>
-          </a:p>
-        </p:txBody>
-      </p:sp>
-      <p:sp>
-        <p:nvSpPr>
-          <p:cNvPr id="7" name="Rectangle 6"/>
+            <a:r>
+              <a:rPr lang="nl-BE" dirty="0" smtClean="0"/>
+              <a:t>N</a:t>
+            </a:r>
+            <a:endParaRPr lang="nl-BE" dirty="0"/>
+          </a:p>
+        </p:txBody>
+      </p:sp>
+      <p:sp>
+        <p:nvSpPr>
+          <p:cNvPr id="6" name="Rectangle 5"/>
           <p:cNvSpPr/>
           <p:nvPr/>
         </p:nvSpPr>
         <p:spPr>
           <a:xfrm>
-            <a:off x="4644008" y="116632"/>
+            <a:off x="3131840" y="116632"/>
             <a:ext cx="1440160" cy="720080"/>
           </a:xfrm>
           <a:prstGeom prst="rect">
@@ -3235,13 +3258,13 @@
       </p:sp>
       <p:sp>
         <p:nvSpPr>
-          <p:cNvPr id="9" name="Rectangle 8"/>
+          <p:cNvPr id="7" name="Rectangle 6"/>
           <p:cNvSpPr/>
           <p:nvPr/>
         </p:nvSpPr>
         <p:spPr>
           <a:xfrm>
-            <a:off x="6223925" y="116632"/>
+            <a:off x="4644008" y="116632"/>
             <a:ext cx="1440160" cy="720080"/>
           </a:xfrm>
           <a:prstGeom prst="rect">
@@ -3275,13 +3298,13 @@
       </p:sp>
       <p:sp>
         <p:nvSpPr>
-          <p:cNvPr id="10" name="Rectangle 9"/>
+          <p:cNvPr id="9" name="Rectangle 8"/>
           <p:cNvSpPr/>
           <p:nvPr/>
         </p:nvSpPr>
         <p:spPr>
           <a:xfrm>
-            <a:off x="7733928" y="114333"/>
+            <a:off x="6223925" y="116632"/>
             <a:ext cx="1440160" cy="720080"/>
           </a:xfrm>
           <a:prstGeom prst="rect">
@@ -3313,19 +3336,58 @@
           </a:p>
         </p:txBody>
       </p:sp>
+      <p:sp>
+        <p:nvSpPr>
+          <p:cNvPr id="10" name="Rectangle 9"/>
+          <p:cNvSpPr/>
+          <p:nvPr/>
+        </p:nvSpPr>
+        <p:spPr>
+          <a:xfrm>
+            <a:off x="7733928" y="114333"/>
+            <a:ext cx="1440160" cy="720080"/>
+          </a:xfrm>
+          <a:prstGeom prst="rect">
+            <a:avLst/>
+          </a:prstGeom>
+        </p:spPr>
+        <p:style>
+          <a:lnRef idx="2">
+            <a:schemeClr val="accent1">
+              <a:shade val="50000"/>
+            </a:schemeClr>
+          </a:lnRef>
+          <a:fillRef idx="1">
+            <a:schemeClr val="accent1"/>
+          </a:fillRef>
+          <a:effectRef idx="0">
+            <a:schemeClr val="accent1"/>
+          </a:effectRef>
+          <a:fontRef idx="minor">
+            <a:schemeClr val="lt1"/>
+          </a:fontRef>
+        </p:style>
+        <p:txBody>
+          <a:bodyPr rtlCol="0" anchor="ctr"/>
+          <a:lstStyle/>
+          <a:p>
+            <a:pPr algn="ctr"/>
+            <a:endParaRPr lang="nl-BE"/>
+          </a:p>
+        </p:txBody>
+      </p:sp>
       <p:cxnSp>
         <p:nvCxnSpPr>
           <p:cNvPr id="12" name="Straight Arrow Connector 11"/>
           <p:cNvCxnSpPr>
-            <a:stCxn id="7" idx="2"/>
             <a:endCxn id="13" idx="0"/>
           </p:cNvCxnSpPr>
           <p:nvPr/>
         </p:nvCxnSpPr>
         <p:spPr>
           <a:xfrm>
-            <a:off x="5364088" y="836712"/>
-            <a:ext cx="2433" cy="432048"/>
+            <a:off x="5350361" y="584394"/>
+            <a:ext cx="16160" cy="684366"/>
           </a:xfrm>
           <a:prstGeom prst="straightConnector1">
             <a:avLst/>
@@ -6081,8 +6143,8 @@
         </p:nvSpPr>
         <p:spPr>
           <a:xfrm rot="10800000">
-            <a:off x="-1686556" y="1474699"/>
-            <a:ext cx="2118087" cy="5060730"/>
+            <a:off x="-1764705" y="1196752"/>
+            <a:ext cx="2118087" cy="5348762"/>
           </a:xfrm>
           <a:prstGeom prst="curvedLeftArrow">
             <a:avLst/>
@@ -6117,6 +6179,96 @@
           </a:p>
         </p:txBody>
       </p:sp>
+      <p:sp>
+        <p:nvSpPr>
+          <p:cNvPr id="3" name="TextBox 2"/>
+          <p:cNvSpPr txBox="1"/>
+          <p:nvPr/>
+        </p:nvSpPr>
+        <p:spPr>
+          <a:xfrm>
+            <a:off x="5068643" y="5013176"/>
+            <a:ext cx="2455685" cy="646331"/>
+          </a:xfrm>
+          <a:prstGeom prst="rect">
+            <a:avLst/>
+          </a:prstGeom>
+          <a:noFill/>
+        </p:spPr>
+        <p:txBody>
+          <a:bodyPr wrap="square" rtlCol="0">
+            <a:spAutoFit/>
+          </a:bodyPr>
+          <a:lstStyle/>
+          <a:p>
+            <a:r>
+              <a:rPr lang="nl-BE" dirty="0" smtClean="0"/>
+              <a:t>Zodra 1 Thread klaar = begin fill (addToNewN).</a:t>
+            </a:r>
+            <a:endParaRPr lang="nl-BE" dirty="0"/>
+          </a:p>
+        </p:txBody>
+      </p:sp>
+      <p:sp>
+        <p:nvSpPr>
+          <p:cNvPr id="18" name="TextBox 17"/>
+          <p:cNvSpPr txBox="1"/>
+          <p:nvPr/>
+        </p:nvSpPr>
+        <p:spPr>
+          <a:xfrm>
+            <a:off x="2854561" y="2974181"/>
+            <a:ext cx="1152128" cy="338554"/>
+          </a:xfrm>
+          <a:prstGeom prst="rect">
+            <a:avLst/>
+          </a:prstGeom>
+          <a:noFill/>
+        </p:spPr>
+        <p:txBody>
+          <a:bodyPr wrap="square" rtlCol="0">
+            <a:spAutoFit/>
+          </a:bodyPr>
+          <a:lstStyle/>
+          <a:p>
+            <a:r>
+              <a:rPr lang="nl-BE" sz="1600" i="1" dirty="0" smtClean="0"/>
+              <a:t>(+ comps)</a:t>
+            </a:r>
+            <a:endParaRPr lang="nl-BE" sz="1600" i="1" dirty="0"/>
+          </a:p>
+        </p:txBody>
+      </p:sp>
+      <p:sp>
+        <p:nvSpPr>
+          <p:cNvPr id="19" name="TextBox 18"/>
+          <p:cNvSpPr txBox="1"/>
+          <p:nvPr/>
+        </p:nvSpPr>
+        <p:spPr>
+          <a:xfrm>
+            <a:off x="6889803" y="3044435"/>
+            <a:ext cx="1152128" cy="338554"/>
+          </a:xfrm>
+          <a:prstGeom prst="rect">
+            <a:avLst/>
+          </a:prstGeom>
+          <a:noFill/>
+        </p:spPr>
+        <p:txBody>
+          <a:bodyPr wrap="square" rtlCol="0">
+            <a:spAutoFit/>
+          </a:bodyPr>
+          <a:lstStyle/>
+          <a:p>
+            <a:r>
+              <a:rPr lang="nl-BE" sz="1600" i="1" dirty="0" smtClean="0"/>
+              <a:t>(+ comps)</a:t>
+            </a:r>
+            <a:endParaRPr lang="nl-BE" sz="1600" i="1" dirty="0"/>
+          </a:p>
+        </p:txBody>
+      </p:sp>
     </p:spTree>
     <p:extLst>
       <p:ext uri="{BB962C8B-B14F-4D97-AF65-F5344CB8AC3E}">
@@ -6127,6 +6279,92 @@
   <p:clrMapOvr>
     <a:masterClrMapping/>
   </p:clrMapOvr>
+  <p:timing>
+    <p:tnLst>
+      <p:par>
+        <p:cTn id="1" dur="indefinite" restart="never" nodeType="tmRoot"/>
+      </p:par>
+    </p:tnLst>
+  </p:timing>
+</p:sld>
+</file>
+
+<file path=ppt/slides/slide4.xml><?xml version="1.0" encoding="utf-8"?>
+<p:sld xmlns:a="http://schemas.openxmlformats.org/drawingml/2006/main" xmlns:r="http://schemas.openxmlformats.org/officeDocument/2006/relationships" xmlns:p="http://schemas.openxmlformats.org/presentationml/2006/main">
+  <p:cSld>
+    <p:spTree>
+      <p:nvGrpSpPr>
+        <p:cNvPr id="1" name=""/>
+        <p:cNvGrpSpPr/>
+        <p:nvPr/>
+      </p:nvGrpSpPr>
+      <p:grpSpPr>
+        <a:xfrm>
+          <a:off x="0" y="0"/>
+          <a:ext cx="0" cy="0"/>
+          <a:chOff x="0" y="0"/>
+          <a:chExt cx="0" cy="0"/>
+        </a:xfrm>
+      </p:grpSpPr>
+      <p:sp>
+        <p:nvSpPr>
+          <p:cNvPr id="2" name="Title 1"/>
+          <p:cNvSpPr>
+            <a:spLocks noGrp="1"/>
+          </p:cNvSpPr>
+          <p:nvPr>
+            <p:ph type="title"/>
+          </p:nvPr>
+        </p:nvSpPr>
+        <p:spPr/>
+        <p:txBody>
+          <a:bodyPr/>
+          <a:lstStyle/>
+          <a:p>
+            <a:r>
+              <a:rPr lang="nl-BE" dirty="0" smtClean="0"/>
+              <a:t>Subsumes</a:t>
+            </a:r>
+            <a:endParaRPr lang="nl-BE" dirty="0"/>
+          </a:p>
+        </p:txBody>
+      </p:sp>
+      <p:sp>
+        <p:nvSpPr>
+          <p:cNvPr id="3" name="Content Placeholder 2"/>
+          <p:cNvSpPr>
+            <a:spLocks noGrp="1"/>
+          </p:cNvSpPr>
+          <p:nvPr>
+            <p:ph idx="1"/>
+          </p:nvPr>
+        </p:nvSpPr>
+        <p:spPr/>
+        <p:txBody>
+          <a:bodyPr/>
+          <a:lstStyle/>
+          <a:p>
+            <a:endParaRPr lang="nl-BE" dirty="0"/>
+          </a:p>
+        </p:txBody>
+      </p:sp>
+    </p:spTree>
+    <p:extLst>
+      <p:ext uri="{BB962C8B-B14F-4D97-AF65-F5344CB8AC3E}">
+        <p14:creationId xmlns:p14="http://schemas.microsoft.com/office/powerpoint/2010/main" val="1668123026"/>
+      </p:ext>
+    </p:extLst>
+  </p:cSld>
+  <p:clrMapOvr>
+    <a:masterClrMapping/>
+  </p:clrMapOvr>
+  <p:timing>
+    <p:tnLst>
+      <p:par>
+        <p:cTn id="1" dur="indefinite" restart="never" nodeType="tmRoot"/>
+      </p:par>
+    </p:tnLst>
+  </p:timing>
 </p:sld>
 </file>
 

</xml_diff>

<commit_message>
Updated representatie van netwerk (W) Updated tijdsbesteding Started 'brainstorming' on implementation w multiple threads.
</commit_message>
<xml_diff>
--- a/Paper_werking_draft.pptx
+++ b/Paper_werking_draft.pptx
@@ -109,7 +109,7 @@
   </p:defaultTextStyle>
   <p:extLst>
     <p:ext uri="{EFAFB233-063F-42B5-8137-9DF3F51BA10A}">
-      <p15:sldGuideLst xmlns:p15="http://schemas.microsoft.com/office/powerpoint/2012/main" xmlns="">
+      <p15:sldGuideLst xmlns="" xmlns:p15="http://schemas.microsoft.com/office/powerpoint/2012/main">
         <p15:guide id="1" orient="horz" pos="2160">
           <p15:clr>
             <a:srgbClr val="A4A3A4"/>
@@ -307,7 +307,7 @@
           <a:p>
             <a:fld id="{9CA7CC6B-6267-4849-ABE7-7E864026F70D}" type="datetimeFigureOut">
               <a:rPr lang="nl-BE" smtClean="0"/>
-              <a:t>18/11/2015</a:t>
+              <a:t>3/02/2016</a:t>
             </a:fld>
             <a:endParaRPr lang="nl-BE"/>
           </a:p>
@@ -477,7 +477,7 @@
           <a:p>
             <a:fld id="{9CA7CC6B-6267-4849-ABE7-7E864026F70D}" type="datetimeFigureOut">
               <a:rPr lang="nl-BE" smtClean="0"/>
-              <a:t>18/11/2015</a:t>
+              <a:t>3/02/2016</a:t>
             </a:fld>
             <a:endParaRPr lang="nl-BE"/>
           </a:p>
@@ -657,7 +657,7 @@
           <a:p>
             <a:fld id="{9CA7CC6B-6267-4849-ABE7-7E864026F70D}" type="datetimeFigureOut">
               <a:rPr lang="nl-BE" smtClean="0"/>
-              <a:t>18/11/2015</a:t>
+              <a:t>3/02/2016</a:t>
             </a:fld>
             <a:endParaRPr lang="nl-BE"/>
           </a:p>
@@ -827,7 +827,7 @@
           <a:p>
             <a:fld id="{9CA7CC6B-6267-4849-ABE7-7E864026F70D}" type="datetimeFigureOut">
               <a:rPr lang="nl-BE" smtClean="0"/>
-              <a:t>18/11/2015</a:t>
+              <a:t>3/02/2016</a:t>
             </a:fld>
             <a:endParaRPr lang="nl-BE"/>
           </a:p>
@@ -1073,7 +1073,7 @@
           <a:p>
             <a:fld id="{9CA7CC6B-6267-4849-ABE7-7E864026F70D}" type="datetimeFigureOut">
               <a:rPr lang="nl-BE" smtClean="0"/>
-              <a:t>18/11/2015</a:t>
+              <a:t>3/02/2016</a:t>
             </a:fld>
             <a:endParaRPr lang="nl-BE"/>
           </a:p>
@@ -1361,7 +1361,7 @@
           <a:p>
             <a:fld id="{9CA7CC6B-6267-4849-ABE7-7E864026F70D}" type="datetimeFigureOut">
               <a:rPr lang="nl-BE" smtClean="0"/>
-              <a:t>18/11/2015</a:t>
+              <a:t>3/02/2016</a:t>
             </a:fld>
             <a:endParaRPr lang="nl-BE"/>
           </a:p>
@@ -1783,7 +1783,7 @@
           <a:p>
             <a:fld id="{9CA7CC6B-6267-4849-ABE7-7E864026F70D}" type="datetimeFigureOut">
               <a:rPr lang="nl-BE" smtClean="0"/>
-              <a:t>18/11/2015</a:t>
+              <a:t>3/02/2016</a:t>
             </a:fld>
             <a:endParaRPr lang="nl-BE"/>
           </a:p>
@@ -1901,7 +1901,7 @@
           <a:p>
             <a:fld id="{9CA7CC6B-6267-4849-ABE7-7E864026F70D}" type="datetimeFigureOut">
               <a:rPr lang="nl-BE" smtClean="0"/>
-              <a:t>18/11/2015</a:t>
+              <a:t>3/02/2016</a:t>
             </a:fld>
             <a:endParaRPr lang="nl-BE"/>
           </a:p>
@@ -1996,7 +1996,7 @@
           <a:p>
             <a:fld id="{9CA7CC6B-6267-4849-ABE7-7E864026F70D}" type="datetimeFigureOut">
               <a:rPr lang="nl-BE" smtClean="0"/>
-              <a:t>18/11/2015</a:t>
+              <a:t>3/02/2016</a:t>
             </a:fld>
             <a:endParaRPr lang="nl-BE"/>
           </a:p>
@@ -2273,7 +2273,7 @@
           <a:p>
             <a:fld id="{9CA7CC6B-6267-4849-ABE7-7E864026F70D}" type="datetimeFigureOut">
               <a:rPr lang="nl-BE" smtClean="0"/>
-              <a:t>18/11/2015</a:t>
+              <a:t>3/02/2016</a:t>
             </a:fld>
             <a:endParaRPr lang="nl-BE"/>
           </a:p>
@@ -2526,7 +2526,7 @@
           <a:p>
             <a:fld id="{9CA7CC6B-6267-4849-ABE7-7E864026F70D}" type="datetimeFigureOut">
               <a:rPr lang="nl-BE" smtClean="0"/>
-              <a:t>18/11/2015</a:t>
+              <a:t>3/02/2016</a:t>
             </a:fld>
             <a:endParaRPr lang="nl-BE"/>
           </a:p>
@@ -2739,7 +2739,7 @@
           <a:p>
             <a:fld id="{9CA7CC6B-6267-4849-ABE7-7E864026F70D}" type="datetimeFigureOut">
               <a:rPr lang="nl-BE" smtClean="0"/>
-              <a:t>18/11/2015</a:t>
+              <a:t>3/02/2016</a:t>
             </a:fld>
             <a:endParaRPr lang="nl-BE"/>
           </a:p>
@@ -3497,8 +3497,8 @@
         </p:nvSpPr>
         <p:spPr>
           <a:xfrm>
-            <a:off x="0" y="215062"/>
-            <a:ext cx="1589043" cy="738664"/>
+            <a:off x="0" y="312911"/>
+            <a:ext cx="1331642" cy="307777"/>
           </a:xfrm>
           <a:prstGeom prst="rect">
             <a:avLst/>
@@ -3513,14 +3513,7 @@
           <a:p>
             <a:r>
               <a:rPr lang="nl-BE" sz="1400" dirty="0" smtClean="0"/>
-              <a:t>LinkedList/ArrayList/Array</a:t>
-            </a:r>
-            <a:br>
-              <a:rPr lang="nl-BE" sz="1400" dirty="0" smtClean="0"/>
-            </a:br>
-            <a:r>
-              <a:rPr lang="nl-BE" sz="1400" dirty="0" smtClean="0"/>
-              <a:t>(BigArray/BigList)</a:t>
+              <a:t>ObjectArrayList</a:t>
             </a:r>
             <a:endParaRPr lang="nl-BE" sz="1400" dirty="0"/>
           </a:p>
@@ -3537,8 +3530,8 @@
         </p:nvCxnSpPr>
         <p:spPr>
           <a:xfrm flipH="1">
-            <a:off x="4319972" y="1844824"/>
-            <a:ext cx="1046549" cy="521702"/>
+            <a:off x="2087725" y="1844824"/>
+            <a:ext cx="3278796" cy="521702"/>
           </a:xfrm>
           <a:prstGeom prst="straightConnector1">
             <a:avLst/>
@@ -3570,7 +3563,7 @@
         </p:nvSpPr>
         <p:spPr>
           <a:xfrm>
-            <a:off x="8033250" y="2366527"/>
+            <a:off x="5801003" y="2366527"/>
             <a:ext cx="1110749" cy="432048"/>
           </a:xfrm>
           <a:prstGeom prst="rect">
@@ -3614,7 +3607,7 @@
         </p:nvSpPr>
         <p:spPr>
           <a:xfrm>
-            <a:off x="5677611" y="2366527"/>
+            <a:off x="3445364" y="2366527"/>
             <a:ext cx="1110749" cy="432048"/>
           </a:xfrm>
           <a:prstGeom prst="rect">
@@ -3658,7 +3651,7 @@
         </p:nvSpPr>
         <p:spPr>
           <a:xfrm>
-            <a:off x="6876256" y="2366527"/>
+            <a:off x="4644009" y="2366527"/>
             <a:ext cx="1110749" cy="432048"/>
           </a:xfrm>
           <a:prstGeom prst="rect">
@@ -3702,7 +3695,7 @@
         </p:nvSpPr>
         <p:spPr>
           <a:xfrm>
-            <a:off x="3563888" y="2366526"/>
+            <a:off x="1331641" y="2366526"/>
             <a:ext cx="1512168" cy="558417"/>
           </a:xfrm>
           <a:prstGeom prst="rect">
@@ -3746,7 +3739,7 @@
         </p:nvSpPr>
         <p:spPr>
           <a:xfrm>
-            <a:off x="3563888" y="3284984"/>
+            <a:off x="1331641" y="3284984"/>
             <a:ext cx="1512168" cy="504056"/>
           </a:xfrm>
           <a:prstGeom prst="rect">
@@ -3790,7 +3783,7 @@
         </p:nvSpPr>
         <p:spPr>
           <a:xfrm>
-            <a:off x="3563888" y="3941440"/>
+            <a:off x="1331641" y="3941440"/>
             <a:ext cx="1512168" cy="504056"/>
           </a:xfrm>
           <a:prstGeom prst="rect">
@@ -3834,7 +3827,7 @@
         </p:nvSpPr>
         <p:spPr>
           <a:xfrm>
-            <a:off x="3563888" y="4581128"/>
+            <a:off x="1331641" y="4581128"/>
             <a:ext cx="1512168" cy="504056"/>
           </a:xfrm>
           <a:prstGeom prst="rect">
@@ -3878,7 +3871,7 @@
         </p:nvSpPr>
         <p:spPr>
           <a:xfrm>
-            <a:off x="3563888" y="5237584"/>
+            <a:off x="1331641" y="5237584"/>
             <a:ext cx="1512168" cy="504056"/>
           </a:xfrm>
           <a:prstGeom prst="rect">
@@ -3922,7 +3915,7 @@
         </p:nvSpPr>
         <p:spPr>
           <a:xfrm>
-            <a:off x="8033250" y="3285489"/>
+            <a:off x="5801003" y="3285489"/>
             <a:ext cx="1110749" cy="432048"/>
           </a:xfrm>
           <a:prstGeom prst="rect">
@@ -3966,7 +3959,7 @@
         </p:nvSpPr>
         <p:spPr>
           <a:xfrm>
-            <a:off x="5677611" y="3285489"/>
+            <a:off x="3445364" y="3285489"/>
             <a:ext cx="1110749" cy="432048"/>
           </a:xfrm>
           <a:prstGeom prst="rect">
@@ -4010,7 +4003,7 @@
         </p:nvSpPr>
         <p:spPr>
           <a:xfrm>
-            <a:off x="6876256" y="3285489"/>
+            <a:off x="4644009" y="3285489"/>
             <a:ext cx="1110749" cy="432048"/>
           </a:xfrm>
           <a:prstGeom prst="rect">
@@ -4054,7 +4047,7 @@
         </p:nvSpPr>
         <p:spPr>
           <a:xfrm>
-            <a:off x="2483767" y="2366526"/>
+            <a:off x="251520" y="2366526"/>
             <a:ext cx="864097" cy="369332"/>
           </a:xfrm>
           <a:prstGeom prst="rect">
@@ -4088,7 +4081,7 @@
         </p:nvSpPr>
         <p:spPr>
           <a:xfrm>
-            <a:off x="2483767" y="3348205"/>
+            <a:off x="251520" y="3348205"/>
             <a:ext cx="864097" cy="369332"/>
           </a:xfrm>
           <a:prstGeom prst="rect">
@@ -4118,7 +4111,7 @@
         </p:nvSpPr>
         <p:spPr>
           <a:xfrm>
-            <a:off x="2483767" y="4008802"/>
+            <a:off x="251520" y="4008802"/>
             <a:ext cx="864097" cy="369332"/>
           </a:xfrm>
           <a:prstGeom prst="rect">
@@ -4148,7 +4141,7 @@
         </p:nvSpPr>
         <p:spPr>
           <a:xfrm>
-            <a:off x="5034092" y="2414043"/>
+            <a:off x="2801845" y="2414043"/>
             <a:ext cx="664858" cy="369332"/>
           </a:xfrm>
           <a:prstGeom prst="rect">
@@ -4178,7 +4171,7 @@
         </p:nvSpPr>
         <p:spPr>
           <a:xfrm>
-            <a:off x="2483768" y="4616644"/>
+            <a:off x="251521" y="4616644"/>
             <a:ext cx="864097" cy="369332"/>
           </a:xfrm>
           <a:prstGeom prst="rect">
@@ -4208,7 +4201,7 @@
         </p:nvSpPr>
         <p:spPr>
           <a:xfrm>
-            <a:off x="2483768" y="5304946"/>
+            <a:off x="251521" y="5304946"/>
             <a:ext cx="864097" cy="369332"/>
           </a:xfrm>
           <a:prstGeom prst="rect">
@@ -4227,6 +4220,330 @@
               <a:t>data[4]</a:t>
             </a:r>
             <a:endParaRPr lang="nl-BE" dirty="0"/>
+          </a:p>
+        </p:txBody>
+      </p:sp>
+      <p:sp>
+        <p:nvSpPr>
+          <p:cNvPr id="34" name="Rectangle 33"/>
+          <p:cNvSpPr/>
+          <p:nvPr/>
+        </p:nvSpPr>
+        <p:spPr>
+          <a:xfrm>
+            <a:off x="1361931" y="5921188"/>
+            <a:ext cx="1512168" cy="504056"/>
+          </a:xfrm>
+          <a:prstGeom prst="rect">
+            <a:avLst/>
+          </a:prstGeom>
+        </p:spPr>
+        <p:style>
+          <a:lnRef idx="2">
+            <a:schemeClr val="accent4">
+              <a:shade val="50000"/>
+            </a:schemeClr>
+          </a:lnRef>
+          <a:fillRef idx="1">
+            <a:schemeClr val="accent4"/>
+          </a:fillRef>
+          <a:effectRef idx="0">
+            <a:schemeClr val="accent4"/>
+          </a:effectRef>
+          <a:fontRef idx="minor">
+            <a:schemeClr val="lt1"/>
+          </a:fontRef>
+        </p:style>
+        <p:txBody>
+          <a:bodyPr rtlCol="0" anchor="ctr"/>
+          <a:lstStyle/>
+          <a:p>
+            <a:pPr algn="ctr"/>
+            <a:r>
+              <a:rPr lang="nl-BE" dirty="0" smtClean="0"/>
+              <a:t>W(C,x,k)</a:t>
+            </a:r>
+            <a:endParaRPr lang="nl-BE" dirty="0"/>
+          </a:p>
+        </p:txBody>
+      </p:sp>
+      <p:sp>
+        <p:nvSpPr>
+          <p:cNvPr id="35" name="TextBox 34"/>
+          <p:cNvSpPr txBox="1"/>
+          <p:nvPr/>
+        </p:nvSpPr>
+        <p:spPr>
+          <a:xfrm>
+            <a:off x="271669" y="5988042"/>
+            <a:ext cx="864097" cy="369332"/>
+          </a:xfrm>
+          <a:prstGeom prst="rect">
+            <a:avLst/>
+          </a:prstGeom>
+          <a:noFill/>
+        </p:spPr>
+        <p:txBody>
+          <a:bodyPr wrap="square" rtlCol="0">
+            <a:spAutoFit/>
+          </a:bodyPr>
+          <a:lstStyle/>
+          <a:p>
+            <a:r>
+              <a:rPr lang="nl-BE" dirty="0" smtClean="0"/>
+              <a:t>data[4]</a:t>
+            </a:r>
+            <a:endParaRPr lang="nl-BE" dirty="0"/>
+          </a:p>
+        </p:txBody>
+      </p:sp>
+      <p:sp>
+        <p:nvSpPr>
+          <p:cNvPr id="45" name="Rectangle 44"/>
+          <p:cNvSpPr/>
+          <p:nvPr/>
+        </p:nvSpPr>
+        <p:spPr>
+          <a:xfrm>
+            <a:off x="5563681" y="5949280"/>
+            <a:ext cx="1110749" cy="432048"/>
+          </a:xfrm>
+          <a:prstGeom prst="rect">
+            <a:avLst/>
+          </a:prstGeom>
+        </p:spPr>
+        <p:style>
+          <a:lnRef idx="2">
+            <a:schemeClr val="accent4">
+              <a:shade val="50000"/>
+            </a:schemeClr>
+          </a:lnRef>
+          <a:fillRef idx="1">
+            <a:schemeClr val="accent4"/>
+          </a:fillRef>
+          <a:effectRef idx="0">
+            <a:schemeClr val="accent4"/>
+          </a:effectRef>
+          <a:fontRef idx="minor">
+            <a:schemeClr val="lt1"/>
+          </a:fontRef>
+        </p:style>
+        <p:txBody>
+          <a:bodyPr rtlCol="0" anchor="ctr"/>
+          <a:lstStyle/>
+          <a:p>
+            <a:pPr algn="ctr"/>
+            <a:r>
+              <a:rPr lang="nl-BE" dirty="0" smtClean="0"/>
+              <a:t>|P|</a:t>
+            </a:r>
+            <a:endParaRPr lang="nl-BE" dirty="0"/>
+          </a:p>
+        </p:txBody>
+      </p:sp>
+      <p:sp>
+        <p:nvSpPr>
+          <p:cNvPr id="46" name="Rectangle 45"/>
+          <p:cNvSpPr/>
+          <p:nvPr/>
+        </p:nvSpPr>
+        <p:spPr>
+          <a:xfrm>
+            <a:off x="3203848" y="5949280"/>
+            <a:ext cx="1110749" cy="432048"/>
+          </a:xfrm>
+          <a:prstGeom prst="rect">
+            <a:avLst/>
+          </a:prstGeom>
+        </p:spPr>
+        <p:style>
+          <a:lnRef idx="2">
+            <a:schemeClr val="accent4">
+              <a:shade val="50000"/>
+            </a:schemeClr>
+          </a:lnRef>
+          <a:fillRef idx="1">
+            <a:schemeClr val="accent4"/>
+          </a:fillRef>
+          <a:effectRef idx="0">
+            <a:schemeClr val="accent4"/>
+          </a:effectRef>
+          <a:fontRef idx="minor">
+            <a:schemeClr val="lt1"/>
+          </a:fontRef>
+        </p:style>
+        <p:txBody>
+          <a:bodyPr rtlCol="0" anchor="ctr"/>
+          <a:lstStyle/>
+          <a:p>
+            <a:pPr algn="ctr"/>
+            <a:r>
+              <a:rPr lang="nl-BE" dirty="0" smtClean="0"/>
+              <a:t>&lt;Short&gt;</a:t>
+            </a:r>
+            <a:endParaRPr lang="nl-BE" dirty="0"/>
+          </a:p>
+        </p:txBody>
+      </p:sp>
+      <p:sp>
+        <p:nvSpPr>
+          <p:cNvPr id="47" name="Rectangle 46"/>
+          <p:cNvSpPr/>
+          <p:nvPr/>
+        </p:nvSpPr>
+        <p:spPr>
+          <a:xfrm>
+            <a:off x="4402493" y="5949280"/>
+            <a:ext cx="1110749" cy="432048"/>
+          </a:xfrm>
+          <a:prstGeom prst="rect">
+            <a:avLst/>
+          </a:prstGeom>
+        </p:spPr>
+        <p:style>
+          <a:lnRef idx="2">
+            <a:schemeClr val="accent4">
+              <a:shade val="50000"/>
+            </a:schemeClr>
+          </a:lnRef>
+          <a:fillRef idx="1">
+            <a:schemeClr val="accent4"/>
+          </a:fillRef>
+          <a:effectRef idx="0">
+            <a:schemeClr val="accent4"/>
+          </a:effectRef>
+          <a:fontRef idx="minor">
+            <a:schemeClr val="lt1"/>
+          </a:fontRef>
+        </p:style>
+        <p:txBody>
+          <a:bodyPr rtlCol="0" anchor="ctr"/>
+          <a:lstStyle/>
+          <a:p>
+            <a:pPr algn="ctr"/>
+            <a:r>
+              <a:rPr lang="nl-BE" dirty="0"/>
+              <a:t>P</a:t>
+            </a:r>
+            <a:endParaRPr lang="nl-BE" dirty="0"/>
+          </a:p>
+        </p:txBody>
+      </p:sp>
+      <p:sp>
+        <p:nvSpPr>
+          <p:cNvPr id="48" name="Rectangle 47"/>
+          <p:cNvSpPr/>
+          <p:nvPr/>
+        </p:nvSpPr>
+        <p:spPr>
+          <a:xfrm>
+            <a:off x="6757188" y="5949280"/>
+            <a:ext cx="1110749" cy="432048"/>
+          </a:xfrm>
+          <a:prstGeom prst="rect">
+            <a:avLst/>
+          </a:prstGeom>
+        </p:spPr>
+        <p:style>
+          <a:lnRef idx="2">
+            <a:schemeClr val="accent4">
+              <a:shade val="50000"/>
+            </a:schemeClr>
+          </a:lnRef>
+          <a:fillRef idx="1">
+            <a:schemeClr val="accent4"/>
+          </a:fillRef>
+          <a:effectRef idx="0">
+            <a:schemeClr val="accent4"/>
+          </a:effectRef>
+          <a:fontRef idx="minor">
+            <a:schemeClr val="lt1"/>
+          </a:fontRef>
+        </p:style>
+        <p:txBody>
+          <a:bodyPr rtlCol="0" anchor="ctr"/>
+          <a:lstStyle/>
+          <a:p>
+            <a:pPr algn="ctr"/>
+            <a:r>
+              <a:rPr lang="nl-BE" dirty="0" smtClean="0"/>
+              <a:t>L</a:t>
+            </a:r>
+            <a:endParaRPr lang="nl-BE" dirty="0"/>
+          </a:p>
+        </p:txBody>
+      </p:sp>
+      <p:sp>
+        <p:nvSpPr>
+          <p:cNvPr id="49" name="Rectangle 48"/>
+          <p:cNvSpPr/>
+          <p:nvPr/>
+        </p:nvSpPr>
+        <p:spPr>
+          <a:xfrm>
+            <a:off x="7898633" y="5956684"/>
+            <a:ext cx="1110749" cy="432048"/>
+          </a:xfrm>
+          <a:prstGeom prst="rect">
+            <a:avLst/>
+          </a:prstGeom>
+        </p:spPr>
+        <p:style>
+          <a:lnRef idx="2">
+            <a:schemeClr val="accent4">
+              <a:shade val="50000"/>
+            </a:schemeClr>
+          </a:lnRef>
+          <a:fillRef idx="1">
+            <a:schemeClr val="accent4"/>
+          </a:fillRef>
+          <a:effectRef idx="0">
+            <a:schemeClr val="accent4"/>
+          </a:effectRef>
+          <a:fontRef idx="minor">
+            <a:schemeClr val="lt1"/>
+          </a:fontRef>
+        </p:style>
+        <p:txBody>
+          <a:bodyPr rtlCol="0" anchor="ctr"/>
+          <a:lstStyle/>
+          <a:p>
+            <a:pPr algn="ctr"/>
+            <a:r>
+              <a:rPr lang="nl-BE" dirty="0" smtClean="0"/>
+              <a:t>|L|</a:t>
+            </a:r>
+            <a:endParaRPr lang="nl-BE" dirty="0"/>
+          </a:p>
+        </p:txBody>
+      </p:sp>
+      <p:sp>
+        <p:nvSpPr>
+          <p:cNvPr id="2" name="TextBox 1"/>
+          <p:cNvSpPr txBox="1"/>
+          <p:nvPr/>
+        </p:nvSpPr>
+        <p:spPr>
+          <a:xfrm>
+            <a:off x="1187592" y="6438802"/>
+            <a:ext cx="1800265" cy="276999"/>
+          </a:xfrm>
+          <a:prstGeom prst="rect">
+            <a:avLst/>
+          </a:prstGeom>
+          <a:noFill/>
+        </p:spPr>
+        <p:txBody>
+          <a:bodyPr wrap="square" rtlCol="0">
+            <a:spAutoFit/>
+          </a:bodyPr>
+          <a:lstStyle/>
+          <a:p>
+            <a:r>
+              <a:rPr lang="nl-BE" sz="1200" dirty="0" smtClean="0"/>
+              <a:t>P=w(C,0,k)	L=w(C1,k)</a:t>
+            </a:r>
+            <a:endParaRPr lang="nl-BE" sz="1200" dirty="0"/>
           </a:p>
         </p:txBody>
       </p:sp>
@@ -5137,7 +5454,7 @@
         </p:nvSpPr>
         <p:spPr>
           <a:xfrm rot="5400000">
-            <a:off x="6784625" y="2383166"/>
+            <a:off x="6712619" y="2383166"/>
             <a:ext cx="1245475" cy="918201"/>
           </a:xfrm>
           <a:prstGeom prst="uturnArrow">
@@ -5181,8 +5498,8 @@
         </p:nvSpPr>
         <p:spPr>
           <a:xfrm>
-            <a:off x="7812360" y="2204864"/>
-            <a:ext cx="2394168" cy="738664"/>
+            <a:off x="7740352" y="2132856"/>
+            <a:ext cx="3096344" cy="954107"/>
           </a:xfrm>
           <a:prstGeom prst="rect">
             <a:avLst/>
@@ -5195,23 +5512,30 @@
           </a:bodyPr>
           <a:lstStyle/>
           <a:p>
+            <a:endParaRPr lang="nl-BE" sz="1400" dirty="0"/>
+          </a:p>
+          <a:p>
+            <a:endParaRPr lang="nl-BE" sz="1400" dirty="0" smtClean="0"/>
+          </a:p>
+          <a:p>
             <a:r>
               <a:rPr lang="nl-BE" sz="1400" dirty="0" smtClean="0"/>
-              <a:t/>
+              <a:t>“set”</a:t>
+            </a:r>
+            <a:r>
+              <a:rPr lang="nl-BE" sz="1400" dirty="0" smtClean="0"/>
+              <a:t>.add</a:t>
+            </a:r>
+            <a:r>
+              <a:rPr lang="nl-BE" sz="1400" dirty="0" smtClean="0"/>
+              <a:t>(</a:t>
             </a:r>
             <a:br>
               <a:rPr lang="nl-BE" sz="1400" dirty="0" smtClean="0"/>
             </a:br>
             <a:r>
               <a:rPr lang="nl-BE" sz="1400" dirty="0" smtClean="0"/>
-              <a:t>hashSet.add(</a:t>
-            </a:r>
-            <a:br>
-              <a:rPr lang="nl-BE" sz="1400" dirty="0" smtClean="0"/>
-            </a:br>
-            <a:r>
-              <a:rPr lang="nl-BE" sz="1400" dirty="0" smtClean="0"/>
-              <a:t>comp(output)</a:t>
+              <a:t>comp(output))</a:t>
             </a:r>
             <a:endParaRPr lang="nl-BE" sz="1400" dirty="0"/>
           </a:p>
@@ -5409,7 +5733,7 @@
         <p:spPr>
           <a:xfrm>
             <a:off x="108686" y="2926685"/>
-            <a:ext cx="1222954" cy="646331"/>
+            <a:ext cx="1222954" cy="369332"/>
           </a:xfrm>
           <a:prstGeom prst="rect">
             <a:avLst/>
@@ -5424,7 +5748,7 @@
           <a:p>
             <a:r>
               <a:rPr lang="nl-BE" dirty="0" smtClean="0"/>
-              <a:t>ShortOpenHashSet</a:t>
+              <a:t>TempArray</a:t>
             </a:r>
             <a:endParaRPr lang="nl-BE" dirty="0"/>
           </a:p>

</xml_diff>